<commit_message>
math finished \ ref to fix$ ref to fix
</commit_message>
<xml_diff>
--- a/figures-ext/multidisc.pptx
+++ b/figures-ext/multidisc.pptx
@@ -104,6 +104,11 @@
       </a:defRPr>
     </a:lvl9pPr>
   </p:defaultTextStyle>
+  <p:extLst>
+    <p:ext uri="{EFAFB233-063F-42B5-8137-9DF3F51BA10A}">
+      <p15:sldGuideLst xmlns:p15="http://schemas.microsoft.com/office/powerpoint/2012/main"/>
+    </p:ext>
+  </p:extLst>
 </p:presentation>
 </file>
 
@@ -256,7 +261,7 @@
           <a:p>
             <a:fld id="{F399F98B-A71E-6341-9A08-C07264DA9E02}" type="datetimeFigureOut">
               <a:rPr lang="en-US" smtClean="0"/>
-              <a:t>4/30/18</a:t>
+              <a:t>6/10/18</a:t>
             </a:fld>
             <a:endParaRPr lang="en-US"/>
           </a:p>
@@ -456,7 +461,7 @@
           <a:p>
             <a:fld id="{F399F98B-A71E-6341-9A08-C07264DA9E02}" type="datetimeFigureOut">
               <a:rPr lang="en-US" smtClean="0"/>
-              <a:t>4/30/18</a:t>
+              <a:t>6/10/18</a:t>
             </a:fld>
             <a:endParaRPr lang="en-US"/>
           </a:p>
@@ -666,7 +671,7 @@
           <a:p>
             <a:fld id="{F399F98B-A71E-6341-9A08-C07264DA9E02}" type="datetimeFigureOut">
               <a:rPr lang="en-US" smtClean="0"/>
-              <a:t>4/30/18</a:t>
+              <a:t>6/10/18</a:t>
             </a:fld>
             <a:endParaRPr lang="en-US"/>
           </a:p>
@@ -866,7 +871,7 @@
           <a:p>
             <a:fld id="{F399F98B-A71E-6341-9A08-C07264DA9E02}" type="datetimeFigureOut">
               <a:rPr lang="en-US" smtClean="0"/>
-              <a:t>4/30/18</a:t>
+              <a:t>6/10/18</a:t>
             </a:fld>
             <a:endParaRPr lang="en-US"/>
           </a:p>
@@ -1142,7 +1147,7 @@
           <a:p>
             <a:fld id="{F399F98B-A71E-6341-9A08-C07264DA9E02}" type="datetimeFigureOut">
               <a:rPr lang="en-US" smtClean="0"/>
-              <a:t>4/30/18</a:t>
+              <a:t>6/10/18</a:t>
             </a:fld>
             <a:endParaRPr lang="en-US"/>
           </a:p>
@@ -1410,7 +1415,7 @@
           <a:p>
             <a:fld id="{F399F98B-A71E-6341-9A08-C07264DA9E02}" type="datetimeFigureOut">
               <a:rPr lang="en-US" smtClean="0"/>
-              <a:t>4/30/18</a:t>
+              <a:t>6/10/18</a:t>
             </a:fld>
             <a:endParaRPr lang="en-US"/>
           </a:p>
@@ -1825,7 +1830,7 @@
           <a:p>
             <a:fld id="{F399F98B-A71E-6341-9A08-C07264DA9E02}" type="datetimeFigureOut">
               <a:rPr lang="en-US" smtClean="0"/>
-              <a:t>4/30/18</a:t>
+              <a:t>6/10/18</a:t>
             </a:fld>
             <a:endParaRPr lang="en-US"/>
           </a:p>
@@ -1967,7 +1972,7 @@
           <a:p>
             <a:fld id="{F399F98B-A71E-6341-9A08-C07264DA9E02}" type="datetimeFigureOut">
               <a:rPr lang="en-US" smtClean="0"/>
-              <a:t>4/30/18</a:t>
+              <a:t>6/10/18</a:t>
             </a:fld>
             <a:endParaRPr lang="en-US"/>
           </a:p>
@@ -2080,7 +2085,7 @@
           <a:p>
             <a:fld id="{F399F98B-A71E-6341-9A08-C07264DA9E02}" type="datetimeFigureOut">
               <a:rPr lang="en-US" smtClean="0"/>
-              <a:t>4/30/18</a:t>
+              <a:t>6/10/18</a:t>
             </a:fld>
             <a:endParaRPr lang="en-US"/>
           </a:p>
@@ -2393,7 +2398,7 @@
           <a:p>
             <a:fld id="{F399F98B-A71E-6341-9A08-C07264DA9E02}" type="datetimeFigureOut">
               <a:rPr lang="en-US" smtClean="0"/>
-              <a:t>4/30/18</a:t>
+              <a:t>6/10/18</a:t>
             </a:fld>
             <a:endParaRPr lang="en-US"/>
           </a:p>
@@ -2682,7 +2687,7 @@
           <a:p>
             <a:fld id="{F399F98B-A71E-6341-9A08-C07264DA9E02}" type="datetimeFigureOut">
               <a:rPr lang="en-US" smtClean="0"/>
-              <a:t>4/30/18</a:t>
+              <a:t>6/10/18</a:t>
             </a:fld>
             <a:endParaRPr lang="en-US"/>
           </a:p>
@@ -2925,7 +2930,7 @@
           <a:p>
             <a:fld id="{F399F98B-A71E-6341-9A08-C07264DA9E02}" type="datetimeFigureOut">
               <a:rPr lang="en-US" smtClean="0"/>
-              <a:t>4/30/18</a:t>
+              <a:t>6/10/18</a:t>
             </a:fld>
             <a:endParaRPr lang="en-US"/>
           </a:p>
@@ -3356,7 +3361,7 @@
         </p:nvGrpSpPr>
         <p:grpSpPr>
           <a:xfrm>
-            <a:off x="5564543" y="1242924"/>
+            <a:off x="5468290" y="1242924"/>
             <a:ext cx="2618509" cy="2330975"/>
             <a:chOff x="4539099" y="1245724"/>
             <a:chExt cx="2618509" cy="2330975"/>
@@ -3798,7 +3803,7 @@
         </p:nvGrpSpPr>
         <p:grpSpPr>
           <a:xfrm>
-            <a:off x="2826571" y="1237931"/>
+            <a:off x="2730318" y="1237931"/>
             <a:ext cx="2618509" cy="2330975"/>
             <a:chOff x="1160814" y="1246909"/>
             <a:chExt cx="2618509" cy="2330975"/>
@@ -4099,8 +4104,8 @@
           </p:nvSpPr>
           <p:spPr>
             <a:xfrm rot="19995186">
-              <a:off x="1695289" y="2274268"/>
-              <a:ext cx="679994" cy="461665"/>
+              <a:off x="1664031" y="2274268"/>
+              <a:ext cx="742511" cy="461665"/>
             </a:xfrm>
             <a:prstGeom prst="rect">
               <a:avLst/>
@@ -4115,7 +4120,7 @@
             <a:p>
               <a:r>
                 <a:rPr lang="en-US" sz="2400" dirty="0"/>
-                <a:t>A+C</a:t>
+                <a:t>A∩C</a:t>
               </a:r>
             </a:p>
           </p:txBody>
@@ -4134,8 +4139,8 @@
           </p:nvSpPr>
           <p:spPr>
             <a:xfrm>
-              <a:off x="2138888" y="2011383"/>
-              <a:ext cx="662361" cy="307777"/>
+              <a:off x="2114824" y="2011383"/>
+              <a:ext cx="736099" cy="307777"/>
             </a:xfrm>
             <a:prstGeom prst="rect">
               <a:avLst/>
@@ -4150,7 +4155,7 @@
             <a:p>
               <a:r>
                 <a:rPr lang="en-US" sz="1400" dirty="0"/>
-                <a:t>A+B+C</a:t>
+                <a:t>A∩B∩C</a:t>
               </a:r>
             </a:p>
           </p:txBody>
@@ -4169,8 +4174,8 @@
           </p:nvSpPr>
           <p:spPr>
             <a:xfrm rot="2168312">
-              <a:off x="2537164" y="2255714"/>
-              <a:ext cx="668773" cy="461665"/>
+              <a:off x="2505906" y="2255714"/>
+              <a:ext cx="731290" cy="461665"/>
             </a:xfrm>
             <a:prstGeom prst="rect">
               <a:avLst/>
@@ -4185,7 +4190,7 @@
             <a:p>
               <a:r>
                 <a:rPr lang="en-US" sz="2400" dirty="0"/>
-                <a:t>B+C</a:t>
+                <a:t>B∩C</a:t>
               </a:r>
             </a:p>
           </p:txBody>
@@ -4204,8 +4209,8 @@
           </p:nvSpPr>
           <p:spPr>
             <a:xfrm rot="5400000">
-              <a:off x="2214311" y="1579047"/>
-              <a:ext cx="558166" cy="369332"/>
+              <a:off x="2191068" y="1579047"/>
+              <a:ext cx="604653" cy="369332"/>
             </a:xfrm>
             <a:prstGeom prst="rect">
               <a:avLst/>
@@ -4220,7 +4225,7 @@
             <a:p>
               <a:r>
                 <a:rPr lang="en-US" dirty="0"/>
-                <a:t>A+B</a:t>
+                <a:t>A∩B</a:t>
               </a:r>
             </a:p>
           </p:txBody>
@@ -4241,14 +4246,14 @@
           <p:nvPr>
             <p:extLst>
               <p:ext uri="{D42A27DB-BD31-4B8C-83A1-F6EECF244321}">
-                <p14:modId xmlns:p14="http://schemas.microsoft.com/office/powerpoint/2010/main" val="4167571123"/>
+                <p14:modId xmlns:p14="http://schemas.microsoft.com/office/powerpoint/2010/main" val="3035037919"/>
               </p:ext>
             </p:extLst>
           </p:nvPr>
         </p:nvGraphicFramePr>
         <p:xfrm>
-          <a:off x="1500544" y="4332195"/>
-          <a:ext cx="8127999" cy="1902354"/>
+          <a:off x="2758957" y="4295827"/>
+          <a:ext cx="5418666" cy="1902354"/>
         </p:xfrm>
         <a:graphic>
           <a:graphicData uri="http://schemas.openxmlformats.org/drawingml/2006/table">
@@ -4257,13 +4262,6 @@
                 <a:tableStyleId>{7E9639D4-E3E2-4D34-9284-5A2195B3D0D7}</a:tableStyleId>
               </a:tblPr>
               <a:tblGrid>
-                <a:gridCol w="2709333">
-                  <a:extLst>
-                    <a:ext uri="{9D8B030D-6E8A-4147-A177-3AD203B41FA5}">
-                      <a16:colId xmlns:a16="http://schemas.microsoft.com/office/drawing/2014/main" val="3782345493"/>
-                    </a:ext>
-                  </a:extLst>
-                </a:gridCol>
                 <a:gridCol w="2709333">
                   <a:extLst>
                     <a:ext uri="{9D8B030D-6E8A-4147-A177-3AD203B41FA5}">
@@ -4285,49 +4283,23 @@
                     <a:bodyPr/>
                     <a:lstStyle/>
                     <a:p>
-                      <a:pPr algn="ctr"/>
-                      <a:r>
-                        <a:rPr lang="en-US" dirty="0"/>
-                        <a:t>Disciplines</a:t>
-                      </a:r>
-                    </a:p>
-                  </a:txBody>
-                  <a:tcPr>
-                    <a:lnL w="12700" cap="flat" cmpd="sng" algn="ctr">
-                      <a:solidFill>
-                        <a:schemeClr val="tx1"/>
-                      </a:solidFill>
-                      <a:prstDash val="solid"/>
-                      <a:round/>
-                      <a:headEnd type="none" w="med" len="med"/>
-                      <a:tailEnd type="none" w="med" len="med"/>
-                    </a:lnL>
-                    <a:lnR w="12700" cap="flat" cmpd="sng" algn="ctr">
-                      <a:solidFill>
-                        <a:schemeClr val="tx1"/>
-                      </a:solidFill>
-                      <a:prstDash val="solid"/>
-                      <a:round/>
-                      <a:headEnd type="none" w="med" len="med"/>
-                      <a:tailEnd type="none" w="med" len="med"/>
-                    </a:lnR>
-                    <a:lnT w="12700" cap="flat" cmpd="sng" algn="ctr">
-                      <a:solidFill>
-                        <a:schemeClr val="tx1"/>
-                      </a:solidFill>
-                      <a:prstDash val="solid"/>
-                      <a:round/>
-                      <a:headEnd type="none" w="med" len="med"/>
-                      <a:tailEnd type="none" w="med" len="med"/>
-                    </a:lnT>
-                  </a:tcPr>
-                </a:tc>
-                <a:tc>
-                  <a:txBody>
-                    <a:bodyPr/>
-                    <a:lstStyle/>
-                    <a:p>
-                      <a:pPr algn="ctr"/>
+                      <a:pPr marL="0" marR="0" lvl="0" indent="0" algn="ctr" defTabSz="914400" rtl="0" eaLnBrk="1" fontAlgn="auto" latinLnBrk="0" hangingPunct="1">
+                        <a:lnSpc>
+                          <a:spcPct val="100000"/>
+                        </a:lnSpc>
+                        <a:spcBef>
+                          <a:spcPts val="0"/>
+                        </a:spcBef>
+                        <a:spcAft>
+                          <a:spcPts val="0"/>
+                        </a:spcAft>
+                        <a:buClrTx/>
+                        <a:buSzTx/>
+                        <a:buFontTx/>
+                        <a:buNone/>
+                        <a:tabLst/>
+                        <a:defRPr/>
+                      </a:pPr>
                       <a:r>
                         <a:rPr lang="en-US" dirty="0" err="1"/>
                         <a:t>Multidisciplinarity</a:t>
@@ -4422,7 +4394,7 @@
                       <a:pPr algn="ctr"/>
                       <a:r>
                         <a:rPr lang="en-US" dirty="0"/>
-                        <a:t>A; B; C</a:t>
+                        <a:t>A∩B∩C</a:t>
                       </a:r>
                     </a:p>
                   </a:txBody>
@@ -4455,40 +4427,7 @@
                       <a:pPr algn="ctr"/>
                       <a:r>
                         <a:rPr lang="en-US" dirty="0"/>
-                        <a:t>A+B+C</a:t>
-                      </a:r>
-                    </a:p>
-                  </a:txBody>
-                  <a:tcPr>
-                    <a:lnL w="12700" cap="flat" cmpd="sng" algn="ctr">
-                      <a:solidFill>
-                        <a:schemeClr val="tx1"/>
-                      </a:solidFill>
-                      <a:prstDash val="solid"/>
-                      <a:round/>
-                      <a:headEnd type="none" w="med" len="med"/>
-                      <a:tailEnd type="none" w="med" len="med"/>
-                    </a:lnL>
-                    <a:lnR w="12700" cap="flat" cmpd="sng" algn="ctr">
-                      <a:solidFill>
-                        <a:schemeClr val="tx1"/>
-                      </a:solidFill>
-                      <a:prstDash val="solid"/>
-                      <a:round/>
-                      <a:headEnd type="none" w="med" len="med"/>
-                      <a:tailEnd type="none" w="med" len="med"/>
-                    </a:lnR>
-                  </a:tcPr>
-                </a:tc>
-                <a:tc>
-                  <a:txBody>
-                    <a:bodyPr/>
-                    <a:lstStyle/>
-                    <a:p>
-                      <a:pPr algn="ctr"/>
-                      <a:r>
-                        <a:rPr lang="en-US" dirty="0"/>
-                        <a:t>A+B+C &lt; E</a:t>
+                        <a:t>A∩B∩C &lt; H</a:t>
                       </a:r>
                     </a:p>
                   </a:txBody>
@@ -4526,39 +4465,9 @@
                     <a:lstStyle/>
                     <a:p>
                       <a:pPr algn="ctr"/>
-                      <a:endParaRPr lang="en-US" dirty="0"/>
-                    </a:p>
-                  </a:txBody>
-                  <a:tcPr>
-                    <a:lnL w="12700" cap="flat" cmpd="sng" algn="ctr">
-                      <a:solidFill>
-                        <a:schemeClr val="tx1"/>
-                      </a:solidFill>
-                      <a:prstDash val="solid"/>
-                      <a:round/>
-                      <a:headEnd type="none" w="med" len="med"/>
-                      <a:tailEnd type="none" w="med" len="med"/>
-                    </a:lnL>
-                    <a:lnR w="12700" cap="flat" cmpd="sng" algn="ctr">
-                      <a:solidFill>
-                        <a:schemeClr val="tx1"/>
-                      </a:solidFill>
-                      <a:prstDash val="solid"/>
-                      <a:round/>
-                      <a:headEnd type="none" w="med" len="med"/>
-                      <a:tailEnd type="none" w="med" len="med"/>
-                    </a:lnR>
-                  </a:tcPr>
-                </a:tc>
-                <a:tc>
-                  <a:txBody>
-                    <a:bodyPr/>
-                    <a:lstStyle/>
-                    <a:p>
-                      <a:pPr algn="ctr"/>
                       <a:r>
                         <a:rPr lang="en-US" dirty="0"/>
-                        <a:t>A+B</a:t>
+                        <a:t>A∩B</a:t>
                       </a:r>
                     </a:p>
                   </a:txBody>
@@ -4591,7 +4500,7 @@
                       <a:pPr algn="ctr"/>
                       <a:r>
                         <a:rPr lang="en-US" dirty="0"/>
-                        <a:t>A+B &lt; F</a:t>
+                        <a:t>A∩B &lt; E</a:t>
                       </a:r>
                     </a:p>
                   </a:txBody>
@@ -4629,39 +4538,9 @@
                     <a:lstStyle/>
                     <a:p>
                       <a:pPr algn="ctr"/>
-                      <a:endParaRPr lang="en-US"/>
-                    </a:p>
-                  </a:txBody>
-                  <a:tcPr>
-                    <a:lnL w="12700" cap="flat" cmpd="sng" algn="ctr">
-                      <a:solidFill>
-                        <a:schemeClr val="tx1"/>
-                      </a:solidFill>
-                      <a:prstDash val="solid"/>
-                      <a:round/>
-                      <a:headEnd type="none" w="med" len="med"/>
-                      <a:tailEnd type="none" w="med" len="med"/>
-                    </a:lnL>
-                    <a:lnR w="12700" cap="flat" cmpd="sng" algn="ctr">
-                      <a:solidFill>
-                        <a:schemeClr val="tx1"/>
-                      </a:solidFill>
-                      <a:prstDash val="solid"/>
-                      <a:round/>
-                      <a:headEnd type="none" w="med" len="med"/>
-                      <a:tailEnd type="none" w="med" len="med"/>
-                    </a:lnR>
-                  </a:tcPr>
-                </a:tc>
-                <a:tc>
-                  <a:txBody>
-                    <a:bodyPr/>
-                    <a:lstStyle/>
-                    <a:p>
-                      <a:pPr algn="ctr"/>
                       <a:r>
                         <a:rPr lang="en-US" dirty="0"/>
-                        <a:t>B+C</a:t>
+                        <a:t>B∩C</a:t>
                       </a:r>
                     </a:p>
                   </a:txBody>
@@ -4694,7 +4573,7 @@
                       <a:pPr algn="ctr"/>
                       <a:r>
                         <a:rPr lang="en-US" dirty="0"/>
-                        <a:t>B+C &lt; G</a:t>
+                        <a:t>B∩C &lt; F</a:t>
                       </a:r>
                     </a:p>
                   </a:txBody>
@@ -4732,48 +4611,9 @@
                     <a:lstStyle/>
                     <a:p>
                       <a:pPr algn="ctr"/>
-                      <a:endParaRPr lang="en-US"/>
-                    </a:p>
-                  </a:txBody>
-                  <a:tcPr>
-                    <a:lnL w="12700" cap="flat" cmpd="sng" algn="ctr">
-                      <a:solidFill>
-                        <a:schemeClr val="tx1"/>
-                      </a:solidFill>
-                      <a:prstDash val="solid"/>
-                      <a:round/>
-                      <a:headEnd type="none" w="med" len="med"/>
-                      <a:tailEnd type="none" w="med" len="med"/>
-                    </a:lnL>
-                    <a:lnR w="12700" cap="flat" cmpd="sng" algn="ctr">
-                      <a:solidFill>
-                        <a:schemeClr val="tx1"/>
-                      </a:solidFill>
-                      <a:prstDash val="solid"/>
-                      <a:round/>
-                      <a:headEnd type="none" w="med" len="med"/>
-                      <a:tailEnd type="none" w="med" len="med"/>
-                    </a:lnR>
-                    <a:lnB w="12700" cap="flat" cmpd="sng" algn="ctr">
-                      <a:solidFill>
-                        <a:schemeClr val="tx1"/>
-                      </a:solidFill>
-                      <a:prstDash val="solid"/>
-                      <a:round/>
-                      <a:headEnd type="none" w="med" len="med"/>
-                      <a:tailEnd type="none" w="med" len="med"/>
-                    </a:lnB>
-                  </a:tcPr>
-                </a:tc>
-                <a:tc>
-                  <a:txBody>
-                    <a:bodyPr/>
-                    <a:lstStyle/>
-                    <a:p>
-                      <a:pPr algn="ctr"/>
                       <a:r>
                         <a:rPr lang="en-US" dirty="0"/>
-                        <a:t>C+B</a:t>
+                        <a:t>C∩B</a:t>
                       </a:r>
                     </a:p>
                   </a:txBody>
@@ -4815,7 +4655,7 @@
                       <a:pPr algn="ctr"/>
                       <a:r>
                         <a:rPr lang="en-US" dirty="0"/>
-                        <a:t>C+B &lt;H</a:t>
+                        <a:t>A∩C &lt; G</a:t>
                       </a:r>
                     </a:p>
                   </a:txBody>
@@ -4859,6 +4699,112 @@
           </a:graphicData>
         </a:graphic>
       </p:graphicFrame>
+      <p:sp>
+        <p:nvSpPr>
+          <p:cNvPr id="2" name="ZoneTexte 1">
+            <a:extLst>
+              <a:ext uri="{FF2B5EF4-FFF2-40B4-BE49-F238E27FC236}">
+                <a16:creationId xmlns:a16="http://schemas.microsoft.com/office/drawing/2014/main" id="{D6306D37-6B57-AC46-B6E0-FAEB5E25FAF2}"/>
+              </a:ext>
+            </a:extLst>
+          </p:cNvPr>
+          <p:cNvSpPr txBox="1"/>
+          <p:nvPr/>
+        </p:nvSpPr>
+        <p:spPr>
+          <a:xfrm>
+            <a:off x="2866766" y="3698276"/>
+            <a:ext cx="2002471" cy="369332"/>
+          </a:xfrm>
+          <a:prstGeom prst="rect">
+            <a:avLst/>
+          </a:prstGeom>
+          <a:noFill/>
+        </p:spPr>
+        <p:txBody>
+          <a:bodyPr wrap="none" rtlCol="0">
+            <a:spAutoFit/>
+          </a:bodyPr>
+          <a:lstStyle/>
+          <a:p>
+            <a:r>
+              <a:rPr lang="en-US" b="1" dirty="0"/>
+              <a:t>Disciplines: A; B; C;</a:t>
+            </a:r>
+          </a:p>
+        </p:txBody>
+      </p:sp>
+      <p:sp>
+        <p:nvSpPr>
+          <p:cNvPr id="3" name="ZoneTexte 2">
+            <a:extLst>
+              <a:ext uri="{FF2B5EF4-FFF2-40B4-BE49-F238E27FC236}">
+                <a16:creationId xmlns:a16="http://schemas.microsoft.com/office/drawing/2014/main" id="{FBA608FF-E2F6-9A49-BA63-422E124F0DF7}"/>
+              </a:ext>
+            </a:extLst>
+          </p:cNvPr>
+          <p:cNvSpPr txBox="1"/>
+          <p:nvPr/>
+        </p:nvSpPr>
+        <p:spPr>
+          <a:xfrm>
+            <a:off x="3034183" y="589230"/>
+            <a:ext cx="1875835" cy="369332"/>
+          </a:xfrm>
+          <a:prstGeom prst="rect">
+            <a:avLst/>
+          </a:prstGeom>
+          <a:noFill/>
+        </p:spPr>
+        <p:txBody>
+          <a:bodyPr wrap="none" rtlCol="0">
+            <a:spAutoFit/>
+          </a:bodyPr>
+          <a:lstStyle/>
+          <a:p>
+            <a:r>
+              <a:rPr lang="en-US" dirty="0" err="1"/>
+              <a:t>Multidisciplinarity</a:t>
+            </a:r>
+            <a:endParaRPr lang="en-US" dirty="0"/>
+          </a:p>
+        </p:txBody>
+      </p:sp>
+      <p:sp>
+        <p:nvSpPr>
+          <p:cNvPr id="7" name="Rectangle 6">
+            <a:extLst>
+              <a:ext uri="{FF2B5EF4-FFF2-40B4-BE49-F238E27FC236}">
+                <a16:creationId xmlns:a16="http://schemas.microsoft.com/office/drawing/2014/main" id="{7E63A360-2D76-CE41-BEC2-9CB3E03E5E6C}"/>
+              </a:ext>
+            </a:extLst>
+          </p:cNvPr>
+          <p:cNvSpPr/>
+          <p:nvPr/>
+        </p:nvSpPr>
+        <p:spPr>
+          <a:xfrm>
+            <a:off x="5868353" y="533230"/>
+            <a:ext cx="1818383" cy="369332"/>
+          </a:xfrm>
+          <a:prstGeom prst="rect">
+            <a:avLst/>
+          </a:prstGeom>
+        </p:spPr>
+        <p:txBody>
+          <a:bodyPr wrap="none">
+            <a:spAutoFit/>
+          </a:bodyPr>
+          <a:lstStyle/>
+          <a:p>
+            <a:pPr algn="ctr"/>
+            <a:r>
+              <a:rPr lang="en-US" dirty="0"/>
+              <a:t>Interdisciplinarity</a:t>
+            </a:r>
+          </a:p>
+        </p:txBody>
+      </p:sp>
     </p:spTree>
     <p:extLst>
       <p:ext uri="{BB962C8B-B14F-4D97-AF65-F5344CB8AC3E}">

</xml_diff>